<commit_message>
lab5 implemented, added presntation1
</commit_message>
<xml_diff>
--- a/2023-24/Etap I/Prezentacje/zadanie2.pptx
+++ b/2023-24/Etap I/Prezentacje/zadanie2.pptx
@@ -5,7 +5,7 @@
     <p:sldMasterId id="2147483648" r:id="rId1"/>
   </p:sldMasterIdLst>
   <p:notesMasterIdLst>
-    <p:notesMasterId r:id="rId28"/>
+    <p:notesMasterId r:id="rId27"/>
   </p:notesMasterIdLst>
   <p:sldIdLst>
     <p:sldId id="256" r:id="rId2"/>
@@ -23,17 +23,16 @@
     <p:sldId id="268" r:id="rId14"/>
     <p:sldId id="270" r:id="rId15"/>
     <p:sldId id="271" r:id="rId16"/>
-    <p:sldId id="272" r:id="rId17"/>
-    <p:sldId id="274" r:id="rId18"/>
-    <p:sldId id="275" r:id="rId19"/>
-    <p:sldId id="276" r:id="rId20"/>
-    <p:sldId id="277" r:id="rId21"/>
-    <p:sldId id="283" r:id="rId22"/>
-    <p:sldId id="278" r:id="rId23"/>
-    <p:sldId id="279" r:id="rId24"/>
-    <p:sldId id="280" r:id="rId25"/>
-    <p:sldId id="281" r:id="rId26"/>
-    <p:sldId id="282" r:id="rId27"/>
+    <p:sldId id="274" r:id="rId17"/>
+    <p:sldId id="275" r:id="rId18"/>
+    <p:sldId id="276" r:id="rId19"/>
+    <p:sldId id="277" r:id="rId20"/>
+    <p:sldId id="283" r:id="rId21"/>
+    <p:sldId id="278" r:id="rId22"/>
+    <p:sldId id="279" r:id="rId23"/>
+    <p:sldId id="280" r:id="rId24"/>
+    <p:sldId id="281" r:id="rId25"/>
+    <p:sldId id="282" r:id="rId26"/>
   </p:sldIdLst>
   <p:sldSz cx="12192000" cy="6858000"/>
   <p:notesSz cx="6858000" cy="9144000"/>
@@ -222,7 +221,7 @@
           <a:p>
             <a:fld id="{65976953-FDD5-4D9F-93C7-3E67B425379B}" type="datetimeFigureOut">
               <a:rPr lang="pl-PL" smtClean="0"/>
-              <a:t>03.07.2024</a:t>
+              <a:t>04.07.2024</a:t>
             </a:fld>
             <a:endParaRPr lang="pl-PL"/>
           </a:p>
@@ -1151,7 +1150,7 @@
     </p:spTree>
     <p:extLst>
       <p:ext uri="{BB962C8B-B14F-4D97-AF65-F5344CB8AC3E}">
-        <p14:creationId xmlns:p14="http://schemas.microsoft.com/office/powerpoint/2010/main" val="3426760568"/>
+        <p14:creationId xmlns:p14="http://schemas.microsoft.com/office/powerpoint/2010/main" val="3347312592"/>
       </p:ext>
     </p:extLst>
   </p:cSld>
@@ -1235,7 +1234,7 @@
     </p:spTree>
     <p:extLst>
       <p:ext uri="{BB962C8B-B14F-4D97-AF65-F5344CB8AC3E}">
-        <p14:creationId xmlns:p14="http://schemas.microsoft.com/office/powerpoint/2010/main" val="3347312592"/>
+        <p14:creationId xmlns:p14="http://schemas.microsoft.com/office/powerpoint/2010/main" val="1828003725"/>
       </p:ext>
     </p:extLst>
   </p:cSld>
@@ -1319,7 +1318,7 @@
     </p:spTree>
     <p:extLst>
       <p:ext uri="{BB962C8B-B14F-4D97-AF65-F5344CB8AC3E}">
-        <p14:creationId xmlns:p14="http://schemas.microsoft.com/office/powerpoint/2010/main" val="1828003725"/>
+        <p14:creationId xmlns:p14="http://schemas.microsoft.com/office/powerpoint/2010/main" val="1086860025"/>
       </p:ext>
     </p:extLst>
   </p:cSld>
@@ -1403,7 +1402,7 @@
     </p:spTree>
     <p:extLst>
       <p:ext uri="{BB962C8B-B14F-4D97-AF65-F5344CB8AC3E}">
-        <p14:creationId xmlns:p14="http://schemas.microsoft.com/office/powerpoint/2010/main" val="1086860025"/>
+        <p14:creationId xmlns:p14="http://schemas.microsoft.com/office/powerpoint/2010/main" val="359570165"/>
       </p:ext>
     </p:extLst>
   </p:cSld>
@@ -1571,7 +1570,7 @@
     </p:spTree>
     <p:extLst>
       <p:ext uri="{BB962C8B-B14F-4D97-AF65-F5344CB8AC3E}">
-        <p14:creationId xmlns:p14="http://schemas.microsoft.com/office/powerpoint/2010/main" val="359570165"/>
+        <p14:creationId xmlns:p14="http://schemas.microsoft.com/office/powerpoint/2010/main" val="4097479640"/>
       </p:ext>
     </p:extLst>
   </p:cSld>
@@ -1655,7 +1654,7 @@
     </p:spTree>
     <p:extLst>
       <p:ext uri="{BB962C8B-B14F-4D97-AF65-F5344CB8AC3E}">
-        <p14:creationId xmlns:p14="http://schemas.microsoft.com/office/powerpoint/2010/main" val="4097479640"/>
+        <p14:creationId xmlns:p14="http://schemas.microsoft.com/office/powerpoint/2010/main" val="216596421"/>
       </p:ext>
     </p:extLst>
   </p:cSld>
@@ -1739,7 +1738,7 @@
     </p:spTree>
     <p:extLst>
       <p:ext uri="{BB962C8B-B14F-4D97-AF65-F5344CB8AC3E}">
-        <p14:creationId xmlns:p14="http://schemas.microsoft.com/office/powerpoint/2010/main" val="216596421"/>
+        <p14:creationId xmlns:p14="http://schemas.microsoft.com/office/powerpoint/2010/main" val="2511422141"/>
       </p:ext>
     </p:extLst>
   </p:cSld>
@@ -1823,7 +1822,7 @@
     </p:spTree>
     <p:extLst>
       <p:ext uri="{BB962C8B-B14F-4D97-AF65-F5344CB8AC3E}">
-        <p14:creationId xmlns:p14="http://schemas.microsoft.com/office/powerpoint/2010/main" val="2511422141"/>
+        <p14:creationId xmlns:p14="http://schemas.microsoft.com/office/powerpoint/2010/main" val="4208048571"/>
       </p:ext>
     </p:extLst>
   </p:cSld>
@@ -1907,7 +1906,7 @@
     </p:spTree>
     <p:extLst>
       <p:ext uri="{BB962C8B-B14F-4D97-AF65-F5344CB8AC3E}">
-        <p14:creationId xmlns:p14="http://schemas.microsoft.com/office/powerpoint/2010/main" val="4208048571"/>
+        <p14:creationId xmlns:p14="http://schemas.microsoft.com/office/powerpoint/2010/main" val="1240219575"/>
       </p:ext>
     </p:extLst>
   </p:cSld>
@@ -1983,90 +1982,6 @@
             <a:fld id="{52D24A7C-7DA2-4388-80A9-D6F523BE782F}" type="slidenum">
               <a:rPr lang="pl-PL" smtClean="0"/>
               <a:t>25</a:t>
-            </a:fld>
-            <a:endParaRPr lang="pl-PL"/>
-          </a:p>
-        </p:txBody>
-      </p:sp>
-    </p:spTree>
-    <p:extLst>
-      <p:ext uri="{BB962C8B-B14F-4D97-AF65-F5344CB8AC3E}">
-        <p14:creationId xmlns:p14="http://schemas.microsoft.com/office/powerpoint/2010/main" val="1240219575"/>
-      </p:ext>
-    </p:extLst>
-  </p:cSld>
-  <p:clrMapOvr>
-    <a:masterClrMapping/>
-  </p:clrMapOvr>
-</p:notes>
-</file>
-
-<file path=ppt/notesSlides/notesSlide26.xml><?xml version="1.0" encoding="utf-8"?>
-<p:notes xmlns:a="http://schemas.openxmlformats.org/drawingml/2006/main" xmlns:r="http://schemas.openxmlformats.org/officeDocument/2006/relationships" xmlns:p="http://schemas.openxmlformats.org/presentationml/2006/main">
-  <p:cSld>
-    <p:spTree>
-      <p:nvGrpSpPr>
-        <p:cNvPr id="1" name=""/>
-        <p:cNvGrpSpPr/>
-        <p:nvPr/>
-      </p:nvGrpSpPr>
-      <p:grpSpPr>
-        <a:xfrm>
-          <a:off x="0" y="0"/>
-          <a:ext cx="0" cy="0"/>
-          <a:chOff x="0" y="0"/>
-          <a:chExt cx="0" cy="0"/>
-        </a:xfrm>
-      </p:grpSpPr>
-      <p:sp>
-        <p:nvSpPr>
-          <p:cNvPr id="2" name="Symbol zastępczy obrazu slajdu 1"/>
-          <p:cNvSpPr>
-            <a:spLocks noGrp="1" noRot="1" noChangeAspect="1"/>
-          </p:cNvSpPr>
-          <p:nvPr>
-            <p:ph type="sldImg"/>
-          </p:nvPr>
-        </p:nvSpPr>
-        <p:spPr/>
-      </p:sp>
-      <p:sp>
-        <p:nvSpPr>
-          <p:cNvPr id="3" name="Symbol zastępczy notatek 2"/>
-          <p:cNvSpPr>
-            <a:spLocks noGrp="1"/>
-          </p:cNvSpPr>
-          <p:nvPr>
-            <p:ph type="body" idx="1"/>
-          </p:nvPr>
-        </p:nvSpPr>
-        <p:spPr/>
-        <p:txBody>
-          <a:bodyPr/>
-          <a:lstStyle/>
-          <a:p>
-            <a:endParaRPr lang="pl-PL"/>
-          </a:p>
-        </p:txBody>
-      </p:sp>
-      <p:sp>
-        <p:nvSpPr>
-          <p:cNvPr id="4" name="Symbol zastępczy numeru slajdu 3"/>
-          <p:cNvSpPr>
-            <a:spLocks noGrp="1"/>
-          </p:cNvSpPr>
-          <p:nvPr>
-            <p:ph type="sldNum" sz="quarter" idx="5"/>
-          </p:nvPr>
-        </p:nvSpPr>
-        <p:spPr/>
-        <p:txBody>
-          <a:bodyPr/>
-          <a:lstStyle/>
-          <a:p>
-            <a:fld id="{52D24A7C-7DA2-4388-80A9-D6F523BE782F}" type="slidenum">
-              <a:rPr lang="pl-PL" smtClean="0"/>
-              <a:t>26</a:t>
             </a:fld>
             <a:endParaRPr lang="pl-PL"/>
           </a:p>
@@ -2820,7 +2735,7 @@
           <a:p>
             <a:fld id="{0C1A7356-0347-4482-95FA-022A0694F35A}" type="datetimeFigureOut">
               <a:rPr lang="pl-PL" smtClean="0"/>
-              <a:t>03.07.2024</a:t>
+              <a:t>04.07.2024</a:t>
             </a:fld>
             <a:endParaRPr lang="pl-PL"/>
           </a:p>
@@ -3018,7 +2933,7 @@
           <a:p>
             <a:fld id="{0C1A7356-0347-4482-95FA-022A0694F35A}" type="datetimeFigureOut">
               <a:rPr lang="pl-PL" smtClean="0"/>
-              <a:t>03.07.2024</a:t>
+              <a:t>04.07.2024</a:t>
             </a:fld>
             <a:endParaRPr lang="pl-PL"/>
           </a:p>
@@ -3226,7 +3141,7 @@
           <a:p>
             <a:fld id="{0C1A7356-0347-4482-95FA-022A0694F35A}" type="datetimeFigureOut">
               <a:rPr lang="pl-PL" smtClean="0"/>
-              <a:t>03.07.2024</a:t>
+              <a:t>04.07.2024</a:t>
             </a:fld>
             <a:endParaRPr lang="pl-PL"/>
           </a:p>
@@ -3424,7 +3339,7 @@
           <a:p>
             <a:fld id="{0C1A7356-0347-4482-95FA-022A0694F35A}" type="datetimeFigureOut">
               <a:rPr lang="pl-PL" smtClean="0"/>
-              <a:t>03.07.2024</a:t>
+              <a:t>04.07.2024</a:t>
             </a:fld>
             <a:endParaRPr lang="pl-PL"/>
           </a:p>
@@ -3699,7 +3614,7 @@
           <a:p>
             <a:fld id="{0C1A7356-0347-4482-95FA-022A0694F35A}" type="datetimeFigureOut">
               <a:rPr lang="pl-PL" smtClean="0"/>
-              <a:t>03.07.2024</a:t>
+              <a:t>04.07.2024</a:t>
             </a:fld>
             <a:endParaRPr lang="pl-PL"/>
           </a:p>
@@ -3964,7 +3879,7 @@
           <a:p>
             <a:fld id="{0C1A7356-0347-4482-95FA-022A0694F35A}" type="datetimeFigureOut">
               <a:rPr lang="pl-PL" smtClean="0"/>
-              <a:t>03.07.2024</a:t>
+              <a:t>04.07.2024</a:t>
             </a:fld>
             <a:endParaRPr lang="pl-PL"/>
           </a:p>
@@ -4376,7 +4291,7 @@
           <a:p>
             <a:fld id="{0C1A7356-0347-4482-95FA-022A0694F35A}" type="datetimeFigureOut">
               <a:rPr lang="pl-PL" smtClean="0"/>
-              <a:t>03.07.2024</a:t>
+              <a:t>04.07.2024</a:t>
             </a:fld>
             <a:endParaRPr lang="pl-PL"/>
           </a:p>
@@ -4517,7 +4432,7 @@
           <a:p>
             <a:fld id="{0C1A7356-0347-4482-95FA-022A0694F35A}" type="datetimeFigureOut">
               <a:rPr lang="pl-PL" smtClean="0"/>
-              <a:t>03.07.2024</a:t>
+              <a:t>04.07.2024</a:t>
             </a:fld>
             <a:endParaRPr lang="pl-PL"/>
           </a:p>
@@ -4630,7 +4545,7 @@
           <a:p>
             <a:fld id="{0C1A7356-0347-4482-95FA-022A0694F35A}" type="datetimeFigureOut">
               <a:rPr lang="pl-PL" smtClean="0"/>
-              <a:t>03.07.2024</a:t>
+              <a:t>04.07.2024</a:t>
             </a:fld>
             <a:endParaRPr lang="pl-PL"/>
           </a:p>
@@ -4941,7 +4856,7 @@
           <a:p>
             <a:fld id="{0C1A7356-0347-4482-95FA-022A0694F35A}" type="datetimeFigureOut">
               <a:rPr lang="pl-PL" smtClean="0"/>
-              <a:t>03.07.2024</a:t>
+              <a:t>04.07.2024</a:t>
             </a:fld>
             <a:endParaRPr lang="pl-PL"/>
           </a:p>
@@ -5229,7 +5144,7 @@
           <a:p>
             <a:fld id="{0C1A7356-0347-4482-95FA-022A0694F35A}" type="datetimeFigureOut">
               <a:rPr lang="pl-PL" smtClean="0"/>
-              <a:t>03.07.2024</a:t>
+              <a:t>04.07.2024</a:t>
             </a:fld>
             <a:endParaRPr lang="pl-PL"/>
           </a:p>
@@ -5473,7 +5388,7 @@
           <a:p>
             <a:fld id="{0C1A7356-0347-4482-95FA-022A0694F35A}" type="datetimeFigureOut">
               <a:rPr lang="pl-PL" smtClean="0"/>
-              <a:t>03.07.2024</a:t>
+              <a:t>04.07.2024</a:t>
             </a:fld>
             <a:endParaRPr lang="pl-PL"/>
           </a:p>
@@ -10115,465 +10030,40 @@
           <a:chExt cx="0" cy="0"/>
         </a:xfrm>
       </p:grpSpPr>
-      <p:sp>
-        <p:nvSpPr>
-          <p:cNvPr id="110" name="pole tekstowe 109">
-            <a:extLst>
-              <a:ext uri="{FF2B5EF4-FFF2-40B4-BE49-F238E27FC236}">
-                <a16:creationId xmlns:a16="http://schemas.microsoft.com/office/drawing/2014/main" id="{BF1DDD12-4F37-A044-01C5-6B288E100048}"/>
-              </a:ext>
-            </a:extLst>
-          </p:cNvPr>
-          <p:cNvSpPr txBox="1"/>
-          <p:nvPr/>
-        </p:nvSpPr>
-        <p:spPr>
-          <a:xfrm>
-            <a:off x="2718816" y="653240"/>
-            <a:ext cx="1042416" cy="830997"/>
-          </a:xfrm>
-          <a:prstGeom prst="rect">
-            <a:avLst/>
-          </a:prstGeom>
-          <a:noFill/>
-        </p:spPr>
-        <p:txBody>
-          <a:bodyPr wrap="square" rtlCol="0" anchor="ctr">
-            <a:spAutoFit/>
-          </a:bodyPr>
-          <a:lstStyle/>
-          <a:p>
-            <a:pPr algn="ctr"/>
-            <a:r>
-              <a:rPr lang="pl-PL" sz="4800" dirty="0">
-                <a:solidFill>
-                  <a:schemeClr val="bg1"/>
-                </a:solidFill>
-                <a:latin typeface="Oswald" pitchFamily="2" charset="-18"/>
-              </a:rPr>
-              <a:t>27</a:t>
-            </a:r>
-          </a:p>
-        </p:txBody>
-      </p:sp>
-      <p:sp>
-        <p:nvSpPr>
-          <p:cNvPr id="112" name="pole tekstowe 111">
-            <a:extLst>
-              <a:ext uri="{FF2B5EF4-FFF2-40B4-BE49-F238E27FC236}">
-                <a16:creationId xmlns:a16="http://schemas.microsoft.com/office/drawing/2014/main" id="{C4397EDA-1732-1416-74EA-B41C9DD7C647}"/>
-              </a:ext>
-            </a:extLst>
-          </p:cNvPr>
-          <p:cNvSpPr txBox="1"/>
-          <p:nvPr/>
-        </p:nvSpPr>
-        <p:spPr>
-          <a:xfrm>
-            <a:off x="6684266" y="653241"/>
-            <a:ext cx="1042416" cy="830997"/>
-          </a:xfrm>
-          <a:prstGeom prst="rect">
-            <a:avLst/>
-          </a:prstGeom>
-          <a:noFill/>
-        </p:spPr>
-        <p:txBody>
-          <a:bodyPr wrap="square" rtlCol="0" anchor="ctr">
-            <a:spAutoFit/>
-          </a:bodyPr>
-          <a:lstStyle/>
-          <a:p>
-            <a:pPr algn="ctr"/>
-            <a:r>
-              <a:rPr lang="pl-PL" sz="4800" dirty="0">
-                <a:solidFill>
-                  <a:schemeClr val="bg1"/>
-                </a:solidFill>
-                <a:latin typeface="Oswald" pitchFamily="2" charset="-18"/>
-              </a:rPr>
-              <a:t>15</a:t>
-            </a:r>
-          </a:p>
-        </p:txBody>
-      </p:sp>
-      <p:cxnSp>
-        <p:nvCxnSpPr>
-          <p:cNvPr id="3" name="Łącznik prosty 2">
-            <a:extLst>
-              <a:ext uri="{FF2B5EF4-FFF2-40B4-BE49-F238E27FC236}">
-                <a16:creationId xmlns:a16="http://schemas.microsoft.com/office/drawing/2014/main" id="{52DEBF50-5A83-B855-25DC-3F5ED3983EC0}"/>
-              </a:ext>
-            </a:extLst>
-          </p:cNvPr>
-          <p:cNvCxnSpPr>
-            <a:cxnSpLocks/>
-          </p:cNvCxnSpPr>
-          <p:nvPr/>
-        </p:nvCxnSpPr>
-        <p:spPr>
-          <a:xfrm>
-            <a:off x="3761232" y="653240"/>
-            <a:ext cx="0" cy="3397551"/>
-          </a:xfrm>
-          <a:prstGeom prst="line">
-            <a:avLst/>
-          </a:prstGeom>
-          <a:ln>
-            <a:solidFill>
-              <a:schemeClr val="bg1"/>
-            </a:solidFill>
-          </a:ln>
-        </p:spPr>
-        <p:style>
-          <a:lnRef idx="2">
-            <a:schemeClr val="accent1"/>
-          </a:lnRef>
-          <a:fillRef idx="0">
-            <a:schemeClr val="accent1"/>
-          </a:fillRef>
-          <a:effectRef idx="1">
-            <a:schemeClr val="accent1"/>
-          </a:effectRef>
-          <a:fontRef idx="minor">
-            <a:schemeClr val="tx1"/>
-          </a:fontRef>
-        </p:style>
-      </p:cxnSp>
-      <p:sp>
-        <p:nvSpPr>
-          <p:cNvPr id="7" name="pole tekstowe 6">
-            <a:extLst>
-              <a:ext uri="{FF2B5EF4-FFF2-40B4-BE49-F238E27FC236}">
-                <a16:creationId xmlns:a16="http://schemas.microsoft.com/office/drawing/2014/main" id="{EB84A655-2E25-421A-D6F8-239E5A549D63}"/>
-              </a:ext>
-            </a:extLst>
-          </p:cNvPr>
-          <p:cNvSpPr txBox="1"/>
-          <p:nvPr/>
-        </p:nvSpPr>
-        <p:spPr>
-          <a:xfrm>
-            <a:off x="3736848" y="653240"/>
-            <a:ext cx="1042416" cy="830997"/>
-          </a:xfrm>
-          <a:prstGeom prst="rect">
-            <a:avLst/>
-          </a:prstGeom>
-          <a:noFill/>
-        </p:spPr>
-        <p:txBody>
-          <a:bodyPr wrap="square" rtlCol="0" anchor="ctr">
-            <a:spAutoFit/>
-          </a:bodyPr>
-          <a:lstStyle/>
-          <a:p>
-            <a:pPr algn="ctr"/>
-            <a:r>
-              <a:rPr lang="pl-PL" sz="4800" dirty="0">
-                <a:solidFill>
-                  <a:schemeClr val="bg1"/>
-                </a:solidFill>
-                <a:latin typeface="Oswald" pitchFamily="2" charset="-18"/>
-              </a:rPr>
-              <a:t>3</a:t>
-            </a:r>
-          </a:p>
-        </p:txBody>
-      </p:sp>
-      <p:cxnSp>
-        <p:nvCxnSpPr>
-          <p:cNvPr id="11" name="Łącznik prosty 10">
-            <a:extLst>
-              <a:ext uri="{FF2B5EF4-FFF2-40B4-BE49-F238E27FC236}">
-                <a16:creationId xmlns:a16="http://schemas.microsoft.com/office/drawing/2014/main" id="{10EB71B8-9D83-EE95-CCAD-0B5255609861}"/>
-              </a:ext>
-            </a:extLst>
-          </p:cNvPr>
-          <p:cNvCxnSpPr>
-            <a:cxnSpLocks/>
-          </p:cNvCxnSpPr>
-          <p:nvPr/>
-        </p:nvCxnSpPr>
-        <p:spPr>
-          <a:xfrm>
-            <a:off x="7726682" y="653241"/>
-            <a:ext cx="0" cy="3397551"/>
-          </a:xfrm>
-          <a:prstGeom prst="line">
-            <a:avLst/>
-          </a:prstGeom>
-          <a:ln>
-            <a:solidFill>
-              <a:schemeClr val="bg1"/>
-            </a:solidFill>
-          </a:ln>
-        </p:spPr>
-        <p:style>
-          <a:lnRef idx="2">
-            <a:schemeClr val="accent1"/>
-          </a:lnRef>
-          <a:fillRef idx="0">
-            <a:schemeClr val="accent1"/>
-          </a:fillRef>
-          <a:effectRef idx="1">
-            <a:schemeClr val="accent1"/>
-          </a:effectRef>
-          <a:fontRef idx="minor">
-            <a:schemeClr val="tx1"/>
-          </a:fontRef>
-        </p:style>
-      </p:cxnSp>
-      <p:sp>
-        <p:nvSpPr>
-          <p:cNvPr id="12" name="pole tekstowe 11">
-            <a:extLst>
-              <a:ext uri="{FF2B5EF4-FFF2-40B4-BE49-F238E27FC236}">
-                <a16:creationId xmlns:a16="http://schemas.microsoft.com/office/drawing/2014/main" id="{CD753D03-C706-E0FE-CD6E-42E3E522623C}"/>
-              </a:ext>
-            </a:extLst>
-          </p:cNvPr>
-          <p:cNvSpPr txBox="1"/>
-          <p:nvPr/>
-        </p:nvSpPr>
-        <p:spPr>
-          <a:xfrm>
-            <a:off x="7815074" y="653240"/>
-            <a:ext cx="1042416" cy="830997"/>
-          </a:xfrm>
-          <a:prstGeom prst="rect">
-            <a:avLst/>
-          </a:prstGeom>
-          <a:noFill/>
-        </p:spPr>
-        <p:txBody>
-          <a:bodyPr wrap="square" rtlCol="0" anchor="ctr">
-            <a:spAutoFit/>
-          </a:bodyPr>
-          <a:lstStyle/>
-          <a:p>
-            <a:pPr algn="ctr"/>
-            <a:r>
-              <a:rPr lang="pl-PL" sz="4800" dirty="0">
-                <a:solidFill>
-                  <a:schemeClr val="bg1"/>
-                </a:solidFill>
-                <a:latin typeface="Oswald" pitchFamily="2" charset="-18"/>
-              </a:rPr>
-              <a:t>3</a:t>
-            </a:r>
-          </a:p>
-        </p:txBody>
-      </p:sp>
-      <p:sp>
-        <p:nvSpPr>
-          <p:cNvPr id="2" name="pole tekstowe 1">
-            <a:extLst>
-              <a:ext uri="{FF2B5EF4-FFF2-40B4-BE49-F238E27FC236}">
-                <a16:creationId xmlns:a16="http://schemas.microsoft.com/office/drawing/2014/main" id="{74F2E44F-020C-6AA4-C0C1-6E72DDD64B48}"/>
-              </a:ext>
-            </a:extLst>
-          </p:cNvPr>
-          <p:cNvSpPr txBox="1"/>
-          <p:nvPr/>
-        </p:nvSpPr>
-        <p:spPr>
-          <a:xfrm>
-            <a:off x="3986784" y="4885110"/>
-            <a:ext cx="3537203" cy="830997"/>
-          </a:xfrm>
-          <a:prstGeom prst="rect">
-            <a:avLst/>
-          </a:prstGeom>
-          <a:noFill/>
-        </p:spPr>
-        <p:txBody>
-          <a:bodyPr wrap="square" rtlCol="0" anchor="ctr">
-            <a:spAutoFit/>
-          </a:bodyPr>
-          <a:lstStyle/>
-          <a:p>
-            <a:pPr algn="ctr"/>
-            <a:r>
-              <a:rPr lang="pl-PL" sz="4800" dirty="0">
-                <a:solidFill>
-                  <a:schemeClr val="bg1"/>
-                </a:solidFill>
-                <a:latin typeface="Oswald" pitchFamily="2" charset="-18"/>
-              </a:rPr>
-              <a:t>Nie są zgodne</a:t>
-            </a:r>
-          </a:p>
-        </p:txBody>
-      </p:sp>
-      <p:sp>
-        <p:nvSpPr>
-          <p:cNvPr id="6" name="pole tekstowe 5">
-            <a:extLst>
-              <a:ext uri="{FF2B5EF4-FFF2-40B4-BE49-F238E27FC236}">
-                <a16:creationId xmlns:a16="http://schemas.microsoft.com/office/drawing/2014/main" id="{CAE97452-B855-1312-73CA-398C8A30EE5B}"/>
-              </a:ext>
-            </a:extLst>
-          </p:cNvPr>
-          <p:cNvSpPr txBox="1"/>
-          <p:nvPr/>
-        </p:nvSpPr>
-        <p:spPr>
-          <a:xfrm>
-            <a:off x="6684266" y="1418288"/>
-            <a:ext cx="1042416" cy="830997"/>
-          </a:xfrm>
-          <a:prstGeom prst="rect">
-            <a:avLst/>
-          </a:prstGeom>
-          <a:noFill/>
-        </p:spPr>
-        <p:txBody>
-          <a:bodyPr wrap="square" rtlCol="0" anchor="ctr">
-            <a:spAutoFit/>
-          </a:bodyPr>
-          <a:lstStyle/>
-          <a:p>
-            <a:pPr algn="ctr"/>
-            <a:r>
-              <a:rPr lang="pl-PL" sz="4800" dirty="0">
-                <a:solidFill>
-                  <a:schemeClr val="bg1"/>
-                </a:solidFill>
-                <a:latin typeface="Oswald" pitchFamily="2" charset="-18"/>
-              </a:rPr>
-              <a:t>5</a:t>
-            </a:r>
-          </a:p>
-        </p:txBody>
-      </p:sp>
-      <p:sp>
-        <p:nvSpPr>
-          <p:cNvPr id="8" name="pole tekstowe 7">
-            <a:extLst>
-              <a:ext uri="{FF2B5EF4-FFF2-40B4-BE49-F238E27FC236}">
-                <a16:creationId xmlns:a16="http://schemas.microsoft.com/office/drawing/2014/main" id="{585C17E8-CC64-E42C-80F7-7CE0270C1D0C}"/>
-              </a:ext>
-            </a:extLst>
-          </p:cNvPr>
-          <p:cNvSpPr txBox="1"/>
-          <p:nvPr/>
-        </p:nvSpPr>
-        <p:spPr>
-          <a:xfrm>
-            <a:off x="2731008" y="1418288"/>
-            <a:ext cx="1042416" cy="830997"/>
-          </a:xfrm>
-          <a:prstGeom prst="rect">
-            <a:avLst/>
-          </a:prstGeom>
-          <a:noFill/>
-        </p:spPr>
-        <p:txBody>
-          <a:bodyPr wrap="square" rtlCol="0" anchor="ctr">
-            <a:spAutoFit/>
-          </a:bodyPr>
-          <a:lstStyle/>
-          <a:p>
-            <a:pPr algn="ctr"/>
-            <a:r>
-              <a:rPr lang="pl-PL" sz="4800" dirty="0">
-                <a:solidFill>
-                  <a:schemeClr val="bg1"/>
-                </a:solidFill>
-                <a:latin typeface="Oswald" pitchFamily="2" charset="-18"/>
-              </a:rPr>
-              <a:t>9</a:t>
-            </a:r>
-          </a:p>
-        </p:txBody>
-      </p:sp>
-      <p:sp>
-        <p:nvSpPr>
-          <p:cNvPr id="9" name="pole tekstowe 8">
-            <a:extLst>
-              <a:ext uri="{FF2B5EF4-FFF2-40B4-BE49-F238E27FC236}">
-                <a16:creationId xmlns:a16="http://schemas.microsoft.com/office/drawing/2014/main" id="{29EEB674-4500-3357-0B47-C3E5FF455DB7}"/>
-              </a:ext>
-            </a:extLst>
-          </p:cNvPr>
-          <p:cNvSpPr txBox="1"/>
-          <p:nvPr/>
-        </p:nvSpPr>
-        <p:spPr>
-          <a:xfrm>
-            <a:off x="3736848" y="1418288"/>
-            <a:ext cx="1042416" cy="830997"/>
-          </a:xfrm>
-          <a:prstGeom prst="rect">
-            <a:avLst/>
-          </a:prstGeom>
-          <a:noFill/>
-        </p:spPr>
-        <p:txBody>
-          <a:bodyPr wrap="square" rtlCol="0" anchor="ctr">
-            <a:spAutoFit/>
-          </a:bodyPr>
-          <a:lstStyle/>
-          <a:p>
-            <a:pPr algn="ctr"/>
-            <a:r>
-              <a:rPr lang="pl-PL" sz="4800" dirty="0">
-                <a:solidFill>
-                  <a:schemeClr val="bg1"/>
-                </a:solidFill>
-                <a:latin typeface="Oswald" pitchFamily="2" charset="-18"/>
-              </a:rPr>
-              <a:t>3</a:t>
-            </a:r>
-          </a:p>
-        </p:txBody>
-      </p:sp>
-      <p:sp>
-        <p:nvSpPr>
-          <p:cNvPr id="10" name="pole tekstowe 9">
-            <a:extLst>
-              <a:ext uri="{FF2B5EF4-FFF2-40B4-BE49-F238E27FC236}">
-                <a16:creationId xmlns:a16="http://schemas.microsoft.com/office/drawing/2014/main" id="{46078D1F-3551-E2A7-6A20-6D4F6077966D}"/>
-              </a:ext>
-            </a:extLst>
-          </p:cNvPr>
-          <p:cNvSpPr txBox="1"/>
-          <p:nvPr/>
-        </p:nvSpPr>
-        <p:spPr>
-          <a:xfrm>
-            <a:off x="7815073" y="1418287"/>
-            <a:ext cx="1042416" cy="830997"/>
-          </a:xfrm>
-          <a:prstGeom prst="rect">
-            <a:avLst/>
-          </a:prstGeom>
-          <a:noFill/>
-        </p:spPr>
-        <p:txBody>
-          <a:bodyPr wrap="square" rtlCol="0" anchor="ctr">
-            <a:spAutoFit/>
-          </a:bodyPr>
-          <a:lstStyle/>
-          <a:p>
-            <a:pPr algn="ctr"/>
-            <a:r>
-              <a:rPr lang="pl-PL" sz="4800" dirty="0">
-                <a:solidFill>
-                  <a:srgbClr val="C00000"/>
-                </a:solidFill>
-                <a:latin typeface="Oswald" pitchFamily="2" charset="-18"/>
-              </a:rPr>
-              <a:t>3</a:t>
-            </a:r>
-          </a:p>
-        </p:txBody>
-      </p:sp>
+      <p:pic>
+        <p:nvPicPr>
+          <p:cNvPr id="5" name="Obraz 4">
+            <a:extLst>
+              <a:ext uri="{FF2B5EF4-FFF2-40B4-BE49-F238E27FC236}">
+                <a16:creationId xmlns:a16="http://schemas.microsoft.com/office/drawing/2014/main" id="{30DECB91-EB60-F239-0B0B-6F31060B7291}"/>
+              </a:ext>
+            </a:extLst>
+          </p:cNvPr>
+          <p:cNvPicPr>
+            <a:picLocks noChangeAspect="1"/>
+          </p:cNvPicPr>
+          <p:nvPr/>
+        </p:nvPicPr>
+        <p:blipFill>
+          <a:blip r:embed="rId3"/>
+          <a:stretch>
+            <a:fillRect/>
+          </a:stretch>
+        </p:blipFill>
+        <p:spPr>
+          <a:xfrm>
+            <a:off x="1121606" y="118600"/>
+            <a:ext cx="6716062" cy="6620799"/>
+          </a:xfrm>
+          <a:prstGeom prst="rect">
+            <a:avLst/>
+          </a:prstGeom>
+        </p:spPr>
+      </p:pic>
     </p:spTree>
     <p:extLst>
       <p:ext uri="{BB962C8B-B14F-4D97-AF65-F5344CB8AC3E}">
-        <p14:creationId xmlns:p14="http://schemas.microsoft.com/office/powerpoint/2010/main" val="2502098891"/>
+        <p14:creationId xmlns:p14="http://schemas.microsoft.com/office/powerpoint/2010/main" val="2515522838"/>
       </p:ext>
     </p:extLst>
   </p:cSld>
@@ -10642,10 +10132,59 @@
           </a:prstGeom>
         </p:spPr>
       </p:pic>
+      <p:sp>
+        <p:nvSpPr>
+          <p:cNvPr id="13" name="Nawias klamrowy zamykający 12">
+            <a:extLst>
+              <a:ext uri="{FF2B5EF4-FFF2-40B4-BE49-F238E27FC236}">
+                <a16:creationId xmlns:a16="http://schemas.microsoft.com/office/drawing/2014/main" id="{CE3060FD-C469-60FA-274E-68DE53A804AC}"/>
+              </a:ext>
+            </a:extLst>
+          </p:cNvPr>
+          <p:cNvSpPr/>
+          <p:nvPr/>
+        </p:nvSpPr>
+        <p:spPr>
+          <a:xfrm>
+            <a:off x="5052290" y="166255"/>
+            <a:ext cx="479829" cy="1219200"/>
+          </a:xfrm>
+          <a:prstGeom prst="rightBrace">
+            <a:avLst/>
+          </a:prstGeom>
+          <a:ln>
+            <a:solidFill>
+              <a:schemeClr val="bg1"/>
+            </a:solidFill>
+          </a:ln>
+        </p:spPr>
+        <p:style>
+          <a:lnRef idx="2">
+            <a:schemeClr val="accent1"/>
+          </a:lnRef>
+          <a:fillRef idx="0">
+            <a:schemeClr val="accent1"/>
+          </a:fillRef>
+          <a:effectRef idx="1">
+            <a:schemeClr val="accent1"/>
+          </a:effectRef>
+          <a:fontRef idx="minor">
+            <a:schemeClr val="tx1"/>
+          </a:fontRef>
+        </p:style>
+        <p:txBody>
+          <a:bodyPr rtlCol="0" anchor="ctr"/>
+          <a:lstStyle/>
+          <a:p>
+            <a:pPr algn="ctr"/>
+            <a:endParaRPr lang="pl-PL"/>
+          </a:p>
+        </p:txBody>
+      </p:sp>
     </p:spTree>
     <p:extLst>
       <p:ext uri="{BB962C8B-B14F-4D97-AF65-F5344CB8AC3E}">
-        <p14:creationId xmlns:p14="http://schemas.microsoft.com/office/powerpoint/2010/main" val="2515522838"/>
+        <p14:creationId xmlns:p14="http://schemas.microsoft.com/office/powerpoint/2010/main" val="1491283693"/>
       </p:ext>
     </p:extLst>
   </p:cSld>
@@ -10763,10 +10302,51 @@
           </a:p>
         </p:txBody>
       </p:sp>
+      <p:sp>
+        <p:nvSpPr>
+          <p:cNvPr id="14" name="pole tekstowe 13">
+            <a:extLst>
+              <a:ext uri="{FF2B5EF4-FFF2-40B4-BE49-F238E27FC236}">
+                <a16:creationId xmlns:a16="http://schemas.microsoft.com/office/drawing/2014/main" id="{EDC3D765-D063-DA55-1B12-D5938E7F9916}"/>
+              </a:ext>
+            </a:extLst>
+          </p:cNvPr>
+          <p:cNvSpPr txBox="1"/>
+          <p:nvPr/>
+        </p:nvSpPr>
+        <p:spPr>
+          <a:xfrm>
+            <a:off x="5452872" y="360356"/>
+            <a:ext cx="1898904" cy="830997"/>
+          </a:xfrm>
+          <a:prstGeom prst="rect">
+            <a:avLst/>
+          </a:prstGeom>
+          <a:noFill/>
+        </p:spPr>
+        <p:txBody>
+          <a:bodyPr wrap="square" rtlCol="0" anchor="ctr">
+            <a:spAutoFit/>
+          </a:bodyPr>
+          <a:lstStyle/>
+          <a:p>
+            <a:pPr algn="ctr"/>
+            <a:r>
+              <a:rPr lang="pl-PL" sz="4800" dirty="0">
+                <a:solidFill>
+                  <a:schemeClr val="bg1"/>
+                </a:solidFill>
+                <a:latin typeface="Oswald" pitchFamily="2" charset="-18"/>
+              </a:rPr>
+              <a:t>45/3</a:t>
+            </a:r>
+          </a:p>
+        </p:txBody>
+      </p:sp>
     </p:spTree>
     <p:extLst>
       <p:ext uri="{BB962C8B-B14F-4D97-AF65-F5344CB8AC3E}">
-        <p14:creationId xmlns:p14="http://schemas.microsoft.com/office/powerpoint/2010/main" val="1491283693"/>
+        <p14:creationId xmlns:p14="http://schemas.microsoft.com/office/powerpoint/2010/main" val="2607766030"/>
       </p:ext>
     </p:extLst>
   </p:cSld>
@@ -10920,7 +10500,7 @@
                 </a:solidFill>
                 <a:latin typeface="Oswald" pitchFamily="2" charset="-18"/>
               </a:rPr>
-              <a:t>45/3</a:t>
+              <a:t>15/3</a:t>
             </a:r>
           </a:p>
         </p:txBody>
@@ -10928,7 +10508,7 @@
     </p:spTree>
     <p:extLst>
       <p:ext uri="{BB962C8B-B14F-4D97-AF65-F5344CB8AC3E}">
-        <p14:creationId xmlns:p14="http://schemas.microsoft.com/office/powerpoint/2010/main" val="2607766030"/>
+        <p14:creationId xmlns:p14="http://schemas.microsoft.com/office/powerpoint/2010/main" val="2497660655"/>
       </p:ext>
     </p:extLst>
   </p:cSld>
@@ -12541,8 +12121,8 @@
         </p:nvSpPr>
         <p:spPr>
           <a:xfrm>
-            <a:off x="5052290" y="166255"/>
-            <a:ext cx="479829" cy="1219200"/>
+            <a:off x="5107154" y="2209798"/>
+            <a:ext cx="479829" cy="1630681"/>
           </a:xfrm>
           <a:prstGeom prst="rightBrace">
             <a:avLst/>
@@ -12576,51 +12156,40 @@
           </a:p>
         </p:txBody>
       </p:sp>
-      <p:sp>
-        <p:nvSpPr>
-          <p:cNvPr id="14" name="pole tekstowe 13">
-            <a:extLst>
-              <a:ext uri="{FF2B5EF4-FFF2-40B4-BE49-F238E27FC236}">
-                <a16:creationId xmlns:a16="http://schemas.microsoft.com/office/drawing/2014/main" id="{EDC3D765-D063-DA55-1B12-D5938E7F9916}"/>
-              </a:ext>
-            </a:extLst>
-          </p:cNvPr>
-          <p:cNvSpPr txBox="1"/>
-          <p:nvPr/>
-        </p:nvSpPr>
-        <p:spPr>
-          <a:xfrm>
-            <a:off x="5452872" y="360356"/>
-            <a:ext cx="1898904" cy="830997"/>
-          </a:xfrm>
-          <a:prstGeom prst="rect">
-            <a:avLst/>
-          </a:prstGeom>
-          <a:noFill/>
-        </p:spPr>
-        <p:txBody>
-          <a:bodyPr wrap="square" rtlCol="0" anchor="ctr">
-            <a:spAutoFit/>
-          </a:bodyPr>
-          <a:lstStyle/>
-          <a:p>
-            <a:pPr algn="ctr"/>
-            <a:r>
-              <a:rPr lang="pl-PL" sz="4800" dirty="0">
-                <a:solidFill>
-                  <a:schemeClr val="bg1"/>
-                </a:solidFill>
-                <a:latin typeface="Oswald" pitchFamily="2" charset="-18"/>
-              </a:rPr>
-              <a:t>15/3</a:t>
-            </a:r>
-          </a:p>
-        </p:txBody>
-      </p:sp>
+      <p:pic>
+        <p:nvPicPr>
+          <p:cNvPr id="3" name="Obraz 2">
+            <a:extLst>
+              <a:ext uri="{FF2B5EF4-FFF2-40B4-BE49-F238E27FC236}">
+                <a16:creationId xmlns:a16="http://schemas.microsoft.com/office/drawing/2014/main" id="{3F46E685-5EBC-2377-7E17-E847D31284C8}"/>
+              </a:ext>
+            </a:extLst>
+          </p:cNvPr>
+          <p:cNvPicPr>
+            <a:picLocks noChangeAspect="1"/>
+          </p:cNvPicPr>
+          <p:nvPr/>
+        </p:nvPicPr>
+        <p:blipFill>
+          <a:blip r:embed="rId4"/>
+          <a:stretch>
+            <a:fillRect/>
+          </a:stretch>
+        </p:blipFill>
+        <p:spPr>
+          <a:xfrm>
+            <a:off x="5766192" y="2814357"/>
+            <a:ext cx="2017872" cy="421561"/>
+          </a:xfrm>
+          <a:prstGeom prst="rect">
+            <a:avLst/>
+          </a:prstGeom>
+        </p:spPr>
+      </p:pic>
     </p:spTree>
     <p:extLst>
       <p:ext uri="{BB962C8B-B14F-4D97-AF65-F5344CB8AC3E}">
-        <p14:creationId xmlns:p14="http://schemas.microsoft.com/office/powerpoint/2010/main" val="2497660655"/>
+        <p14:creationId xmlns:p14="http://schemas.microsoft.com/office/powerpoint/2010/main" val="4120670262"/>
       </p:ext>
     </p:extLst>
   </p:cSld>
@@ -12703,8 +12272,8 @@
         </p:nvSpPr>
         <p:spPr>
           <a:xfrm>
-            <a:off x="5107154" y="2209798"/>
-            <a:ext cx="479829" cy="1630681"/>
+            <a:off x="4735299" y="3945773"/>
+            <a:ext cx="479829" cy="863972"/>
           </a:xfrm>
           <a:prstGeom prst="rightBrace">
             <a:avLst/>
@@ -12738,40 +12307,10 @@
           </a:p>
         </p:txBody>
       </p:sp>
-      <p:pic>
-        <p:nvPicPr>
-          <p:cNvPr id="3" name="Obraz 2">
-            <a:extLst>
-              <a:ext uri="{FF2B5EF4-FFF2-40B4-BE49-F238E27FC236}">
-                <a16:creationId xmlns:a16="http://schemas.microsoft.com/office/drawing/2014/main" id="{3F46E685-5EBC-2377-7E17-E847D31284C8}"/>
-              </a:ext>
-            </a:extLst>
-          </p:cNvPr>
-          <p:cNvPicPr>
-            <a:picLocks noChangeAspect="1"/>
-          </p:cNvPicPr>
-          <p:nvPr/>
-        </p:nvPicPr>
-        <p:blipFill>
-          <a:blip r:embed="rId4"/>
-          <a:stretch>
-            <a:fillRect/>
-          </a:stretch>
-        </p:blipFill>
-        <p:spPr>
-          <a:xfrm>
-            <a:off x="5766192" y="2814357"/>
-            <a:ext cx="2017872" cy="421561"/>
-          </a:xfrm>
-          <a:prstGeom prst="rect">
-            <a:avLst/>
-          </a:prstGeom>
-        </p:spPr>
-      </p:pic>
     </p:spTree>
     <p:extLst>
       <p:ext uri="{BB962C8B-B14F-4D97-AF65-F5344CB8AC3E}">
-        <p14:creationId xmlns:p14="http://schemas.microsoft.com/office/powerpoint/2010/main" val="4120670262"/>
+        <p14:creationId xmlns:p14="http://schemas.microsoft.com/office/powerpoint/2010/main" val="1054207111"/>
       </p:ext>
     </p:extLst>
   </p:cSld>
@@ -12854,8 +12393,8 @@
         </p:nvSpPr>
         <p:spPr>
           <a:xfrm>
-            <a:off x="4735299" y="3945773"/>
-            <a:ext cx="479829" cy="863972"/>
+            <a:off x="4479637" y="5125348"/>
+            <a:ext cx="479829" cy="1467475"/>
           </a:xfrm>
           <a:prstGeom prst="rightBrace">
             <a:avLst/>
@@ -12889,10 +12428,40 @@
           </a:p>
         </p:txBody>
       </p:sp>
+      <p:pic>
+        <p:nvPicPr>
+          <p:cNvPr id="3" name="Obraz 2">
+            <a:extLst>
+              <a:ext uri="{FF2B5EF4-FFF2-40B4-BE49-F238E27FC236}">
+                <a16:creationId xmlns:a16="http://schemas.microsoft.com/office/drawing/2014/main" id="{2747568E-DD1E-0AF2-480E-283C6EBECF0F}"/>
+              </a:ext>
+            </a:extLst>
+          </p:cNvPr>
+          <p:cNvPicPr>
+            <a:picLocks noChangeAspect="1"/>
+          </p:cNvPicPr>
+          <p:nvPr/>
+        </p:nvPicPr>
+        <p:blipFill>
+          <a:blip r:embed="rId4"/>
+          <a:stretch>
+            <a:fillRect/>
+          </a:stretch>
+        </p:blipFill>
+        <p:spPr>
+          <a:xfrm>
+            <a:off x="5084065" y="5118353"/>
+            <a:ext cx="2441448" cy="1474470"/>
+          </a:xfrm>
+          <a:prstGeom prst="rect">
+            <a:avLst/>
+          </a:prstGeom>
+        </p:spPr>
+      </p:pic>
     </p:spTree>
     <p:extLst>
       <p:ext uri="{BB962C8B-B14F-4D97-AF65-F5344CB8AC3E}">
-        <p14:creationId xmlns:p14="http://schemas.microsoft.com/office/powerpoint/2010/main" val="1054207111"/>
+        <p14:creationId xmlns:p14="http://schemas.microsoft.com/office/powerpoint/2010/main" val="3223762839"/>
       </p:ext>
     </p:extLst>
   </p:cSld>
@@ -12933,10 +12502,10 @@
       </p:grpSpPr>
       <p:pic>
         <p:nvPicPr>
-          <p:cNvPr id="5" name="Obraz 4">
-            <a:extLst>
-              <a:ext uri="{FF2B5EF4-FFF2-40B4-BE49-F238E27FC236}">
-                <a16:creationId xmlns:a16="http://schemas.microsoft.com/office/drawing/2014/main" id="{30DECB91-EB60-F239-0B0B-6F31060B7291}"/>
+          <p:cNvPr id="4" name="Obraz 3">
+            <a:extLst>
+              <a:ext uri="{FF2B5EF4-FFF2-40B4-BE49-F238E27FC236}">
+                <a16:creationId xmlns:a16="http://schemas.microsoft.com/office/drawing/2014/main" id="{5C869100-22BC-B1A5-6799-3C0181D8FEA4}"/>
               </a:ext>
             </a:extLst>
           </p:cNvPr>
@@ -12953,69 +12522,20 @@
         </p:blipFill>
         <p:spPr>
           <a:xfrm>
-            <a:off x="1121606" y="118600"/>
-            <a:ext cx="6716062" cy="6620799"/>
+            <a:off x="1266150" y="985496"/>
+            <a:ext cx="7278116" cy="4887007"/>
           </a:xfrm>
           <a:prstGeom prst="rect">
             <a:avLst/>
           </a:prstGeom>
         </p:spPr>
       </p:pic>
-      <p:sp>
-        <p:nvSpPr>
-          <p:cNvPr id="13" name="Nawias klamrowy zamykający 12">
-            <a:extLst>
-              <a:ext uri="{FF2B5EF4-FFF2-40B4-BE49-F238E27FC236}">
-                <a16:creationId xmlns:a16="http://schemas.microsoft.com/office/drawing/2014/main" id="{CE3060FD-C469-60FA-274E-68DE53A804AC}"/>
-              </a:ext>
-            </a:extLst>
-          </p:cNvPr>
-          <p:cNvSpPr/>
-          <p:nvPr/>
-        </p:nvSpPr>
-        <p:spPr>
-          <a:xfrm>
-            <a:off x="4479637" y="5125348"/>
-            <a:ext cx="479829" cy="1467475"/>
-          </a:xfrm>
-          <a:prstGeom prst="rightBrace">
-            <a:avLst/>
-          </a:prstGeom>
-          <a:ln>
-            <a:solidFill>
-              <a:schemeClr val="bg1"/>
-            </a:solidFill>
-          </a:ln>
-        </p:spPr>
-        <p:style>
-          <a:lnRef idx="2">
-            <a:schemeClr val="accent1"/>
-          </a:lnRef>
-          <a:fillRef idx="0">
-            <a:schemeClr val="accent1"/>
-          </a:fillRef>
-          <a:effectRef idx="1">
-            <a:schemeClr val="accent1"/>
-          </a:effectRef>
-          <a:fontRef idx="minor">
-            <a:schemeClr val="tx1"/>
-          </a:fontRef>
-        </p:style>
-        <p:txBody>
-          <a:bodyPr rtlCol="0" anchor="ctr"/>
-          <a:lstStyle/>
-          <a:p>
-            <a:pPr algn="ctr"/>
-            <a:endParaRPr lang="pl-PL"/>
-          </a:p>
-        </p:txBody>
-      </p:sp>
       <p:pic>
         <p:nvPicPr>
-          <p:cNvPr id="3" name="Obraz 2">
-            <a:extLst>
-              <a:ext uri="{FF2B5EF4-FFF2-40B4-BE49-F238E27FC236}">
-                <a16:creationId xmlns:a16="http://schemas.microsoft.com/office/drawing/2014/main" id="{2747568E-DD1E-0AF2-480E-283C6EBECF0F}"/>
+          <p:cNvPr id="7" name="Obraz 6">
+            <a:extLst>
+              <a:ext uri="{FF2B5EF4-FFF2-40B4-BE49-F238E27FC236}">
+                <a16:creationId xmlns:a16="http://schemas.microsoft.com/office/drawing/2014/main" id="{FF25ADAF-E9BB-81F3-7E95-18FD3EBEDE24}"/>
               </a:ext>
             </a:extLst>
           </p:cNvPr>
@@ -13032,8 +12552,8 @@
         </p:blipFill>
         <p:spPr>
           <a:xfrm>
-            <a:off x="5084065" y="5118353"/>
-            <a:ext cx="2441448" cy="1474470"/>
+            <a:off x="8723376" y="2261329"/>
+            <a:ext cx="2362922" cy="2335339"/>
           </a:xfrm>
           <a:prstGeom prst="rect">
             <a:avLst/>
@@ -13043,7 +12563,7 @@
     </p:spTree>
     <p:extLst>
       <p:ext uri="{BB962C8B-B14F-4D97-AF65-F5344CB8AC3E}">
-        <p14:creationId xmlns:p14="http://schemas.microsoft.com/office/powerpoint/2010/main" val="3223762839"/>
+        <p14:creationId xmlns:p14="http://schemas.microsoft.com/office/powerpoint/2010/main" val="1276273647"/>
       </p:ext>
     </p:extLst>
   </p:cSld>
@@ -13084,108 +12604,6 @@
       </p:grpSpPr>
       <p:pic>
         <p:nvPicPr>
-          <p:cNvPr id="4" name="Obraz 3">
-            <a:extLst>
-              <a:ext uri="{FF2B5EF4-FFF2-40B4-BE49-F238E27FC236}">
-                <a16:creationId xmlns:a16="http://schemas.microsoft.com/office/drawing/2014/main" id="{5C869100-22BC-B1A5-6799-3C0181D8FEA4}"/>
-              </a:ext>
-            </a:extLst>
-          </p:cNvPr>
-          <p:cNvPicPr>
-            <a:picLocks noChangeAspect="1"/>
-          </p:cNvPicPr>
-          <p:nvPr/>
-        </p:nvPicPr>
-        <p:blipFill>
-          <a:blip r:embed="rId3"/>
-          <a:stretch>
-            <a:fillRect/>
-          </a:stretch>
-        </p:blipFill>
-        <p:spPr>
-          <a:xfrm>
-            <a:off x="1266150" y="985496"/>
-            <a:ext cx="7278116" cy="4887007"/>
-          </a:xfrm>
-          <a:prstGeom prst="rect">
-            <a:avLst/>
-          </a:prstGeom>
-        </p:spPr>
-      </p:pic>
-      <p:pic>
-        <p:nvPicPr>
-          <p:cNvPr id="7" name="Obraz 6">
-            <a:extLst>
-              <a:ext uri="{FF2B5EF4-FFF2-40B4-BE49-F238E27FC236}">
-                <a16:creationId xmlns:a16="http://schemas.microsoft.com/office/drawing/2014/main" id="{FF25ADAF-E9BB-81F3-7E95-18FD3EBEDE24}"/>
-              </a:ext>
-            </a:extLst>
-          </p:cNvPr>
-          <p:cNvPicPr>
-            <a:picLocks noChangeAspect="1"/>
-          </p:cNvPicPr>
-          <p:nvPr/>
-        </p:nvPicPr>
-        <p:blipFill>
-          <a:blip r:embed="rId4"/>
-          <a:stretch>
-            <a:fillRect/>
-          </a:stretch>
-        </p:blipFill>
-        <p:spPr>
-          <a:xfrm>
-            <a:off x="8723376" y="2261329"/>
-            <a:ext cx="2362922" cy="2335339"/>
-          </a:xfrm>
-          <a:prstGeom prst="rect">
-            <a:avLst/>
-          </a:prstGeom>
-        </p:spPr>
-      </p:pic>
-    </p:spTree>
-    <p:extLst>
-      <p:ext uri="{BB962C8B-B14F-4D97-AF65-F5344CB8AC3E}">
-        <p14:creationId xmlns:p14="http://schemas.microsoft.com/office/powerpoint/2010/main" val="1276273647"/>
-      </p:ext>
-    </p:extLst>
-  </p:cSld>
-  <p:clrMapOvr>
-    <a:masterClrMapping/>
-  </p:clrMapOvr>
-  <mc:AlternateContent xmlns:mc="http://schemas.openxmlformats.org/markup-compatibility/2006" xmlns:p159="http://schemas.microsoft.com/office/powerpoint/2015/09/main">
-    <mc:Choice Requires="p159">
-      <p:transition xmlns:p14="http://schemas.microsoft.com/office/powerpoint/2010/main" spd="slow" p14:dur="2000">
-        <p159:morph option="byObject"/>
-      </p:transition>
-    </mc:Choice>
-    <mc:Fallback xmlns="">
-      <p:transition spd="slow">
-        <p:fade/>
-      </p:transition>
-    </mc:Fallback>
-  </mc:AlternateContent>
-</p:sld>
-</file>
-
-<file path=ppt/slides/slide25.xml><?xml version="1.0" encoding="utf-8"?>
-<p:sld xmlns:a="http://schemas.openxmlformats.org/drawingml/2006/main" xmlns:r="http://schemas.openxmlformats.org/officeDocument/2006/relationships" xmlns:p="http://schemas.openxmlformats.org/presentationml/2006/main">
-  <p:cSld>
-    <p:spTree>
-      <p:nvGrpSpPr>
-        <p:cNvPr id="1" name=""/>
-        <p:cNvGrpSpPr/>
-        <p:nvPr/>
-      </p:nvGrpSpPr>
-      <p:grpSpPr>
-        <a:xfrm>
-          <a:off x="0" y="0"/>
-          <a:ext cx="0" cy="0"/>
-          <a:chOff x="0" y="0"/>
-          <a:chExt cx="0" cy="0"/>
-        </a:xfrm>
-      </p:grpSpPr>
-      <p:pic>
-        <p:nvPicPr>
           <p:cNvPr id="3" name="Obraz 2">
             <a:extLst>
               <a:ext uri="{FF2B5EF4-FFF2-40B4-BE49-F238E27FC236}">
@@ -13318,7 +12736,7 @@
 </p:sld>
 </file>
 
-<file path=ppt/slides/slide26.xml><?xml version="1.0" encoding="utf-8"?>
+<file path=ppt/slides/slide25.xml><?xml version="1.0" encoding="utf-8"?>
 <p:sld xmlns:a="http://schemas.openxmlformats.org/drawingml/2006/main" xmlns:r="http://schemas.openxmlformats.org/officeDocument/2006/relationships" xmlns:p="http://schemas.openxmlformats.org/presentationml/2006/main">
   <p:cSld>
     <p:spTree>

</xml_diff>